<commit_message>
update master meeting presentation
</commit_message>
<xml_diff>
--- a/פגישות עמי/פגישה11_11.pptx
+++ b/פגישות עמי/פגישה11_11.pptx
@@ -6,18 +6,19 @@
     <p:sldMasterId id="2147483660" r:id="rId2"/>
   </p:sldMasterIdLst>
   <p:notesMasterIdLst>
-    <p:notesMasterId r:id="rId12"/>
+    <p:notesMasterId r:id="rId13"/>
   </p:notesMasterIdLst>
   <p:sldIdLst>
     <p:sldId id="259" r:id="rId3"/>
     <p:sldId id="261" r:id="rId4"/>
     <p:sldId id="262" r:id="rId5"/>
     <p:sldId id="263" r:id="rId6"/>
-    <p:sldId id="257" r:id="rId7"/>
-    <p:sldId id="256" r:id="rId8"/>
-    <p:sldId id="260" r:id="rId9"/>
-    <p:sldId id="264" r:id="rId10"/>
-    <p:sldId id="265" r:id="rId11"/>
+    <p:sldId id="266" r:id="rId7"/>
+    <p:sldId id="257" r:id="rId8"/>
+    <p:sldId id="256" r:id="rId9"/>
+    <p:sldId id="260" r:id="rId10"/>
+    <p:sldId id="264" r:id="rId11"/>
+    <p:sldId id="265" r:id="rId12"/>
   </p:sldIdLst>
   <p:sldSz cx="12192000" cy="6858000"/>
   <p:notesSz cx="6858000" cy="9144000"/>
@@ -116,6 +117,11 @@
       </a:defRPr>
     </a:lvl9pPr>
   </p:defaultTextStyle>
+  <p:extLst>
+    <p:ext uri="{EFAFB233-063F-42B5-8137-9DF3F51BA10A}">
+      <p15:sldGuideLst xmlns:p15="http://schemas.microsoft.com/office/powerpoint/2012/main"/>
+    </p:ext>
+  </p:extLst>
 </p:presentation>
 </file>
 
@@ -201,7 +207,7 @@
           <a:p>
             <a:fld id="{A5A8BB2B-C565-4FE9-874C-9EE28C4F28CB}" type="datetimeFigureOut">
               <a:rPr lang="en-US" smtClean="0"/>
-              <a:t>06-11-19</a:t>
+              <a:t>07-11-19</a:t>
             </a:fld>
             <a:endParaRPr lang="en-US" dirty="0"/>
           </a:p>
@@ -599,7 +605,7 @@
                 <a:tabLst/>
                 <a:defRPr/>
               </a:pPr>
-              <a:t>5</a:t>
+              <a:t>6</a:t>
             </a:fld>
             <a:endParaRPr kumimoji="0" lang="en-US" sz="1200" b="0" i="0" u="none" strike="noStrike" kern="1200" cap="none" spc="0" normalizeH="0" baseline="0" noProof="0" dirty="0">
               <a:ln>
@@ -811,7 +817,7 @@
                 <a:tabLst/>
                 <a:defRPr/>
               </a:pPr>
-              <a:t>6</a:t>
+              <a:t>7</a:t>
             </a:fld>
             <a:endParaRPr kumimoji="0" lang="en-US" sz="1200" b="0" i="0" u="none" strike="noStrike" kern="1200" cap="none" spc="0" normalizeH="0" baseline="0" noProof="0" dirty="0">
               <a:ln>
@@ -974,7 +980,7 @@
           <a:p>
             <a:fld id="{AB814CEC-9F17-496B-99D6-DCE4BD5734FE}" type="datetimeFigureOut">
               <a:rPr lang="en-US" smtClean="0"/>
-              <a:t>06-11-19</a:t>
+              <a:t>07-11-19</a:t>
             </a:fld>
             <a:endParaRPr lang="en-US" dirty="0"/>
           </a:p>
@@ -1144,7 +1150,7 @@
           <a:p>
             <a:fld id="{AB814CEC-9F17-496B-99D6-DCE4BD5734FE}" type="datetimeFigureOut">
               <a:rPr lang="en-US" smtClean="0"/>
-              <a:t>06-11-19</a:t>
+              <a:t>07-11-19</a:t>
             </a:fld>
             <a:endParaRPr lang="en-US" dirty="0"/>
           </a:p>
@@ -1324,7 +1330,7 @@
           <a:p>
             <a:fld id="{AB814CEC-9F17-496B-99D6-DCE4BD5734FE}" type="datetimeFigureOut">
               <a:rPr lang="en-US" smtClean="0"/>
-              <a:t>06-11-19</a:t>
+              <a:t>07-11-19</a:t>
             </a:fld>
             <a:endParaRPr lang="en-US" dirty="0"/>
           </a:p>
@@ -1532,7 +1538,7 @@
           <a:p>
             <a:fld id="{9C751D70-D894-47B1-BA5C-A2BA7FFD222B}" type="datetime1">
               <a:rPr lang="en-US" smtClean="0"/>
-              <a:t>06-11-19</a:t>
+              <a:t>07-11-19</a:t>
             </a:fld>
             <a:endParaRPr lang="en-US" dirty="0"/>
           </a:p>
@@ -1730,7 +1736,7 @@
           <a:p>
             <a:fld id="{02B5EBCD-4AC6-4D4B-8D35-AC0651D82AB2}" type="datetime1">
               <a:rPr lang="en-US" smtClean="0"/>
-              <a:t>06-11-19</a:t>
+              <a:t>07-11-19</a:t>
             </a:fld>
             <a:endParaRPr lang="en-US" dirty="0"/>
           </a:p>
@@ -2005,7 +2011,7 @@
           <a:p>
             <a:fld id="{550CDAF3-9A51-438D-B1D0-14E681CB3177}" type="datetime1">
               <a:rPr lang="en-US" smtClean="0"/>
-              <a:t>06-11-19</a:t>
+              <a:t>07-11-19</a:t>
             </a:fld>
             <a:endParaRPr lang="en-US" dirty="0"/>
           </a:p>
@@ -2270,7 +2276,7 @@
           <a:p>
             <a:fld id="{D73AE37D-569C-4479-B38B-B24A0379D2E8}" type="datetime1">
               <a:rPr lang="en-US" smtClean="0"/>
-              <a:t>06-11-19</a:t>
+              <a:t>07-11-19</a:t>
             </a:fld>
             <a:endParaRPr lang="en-US" dirty="0"/>
           </a:p>
@@ -2682,7 +2688,7 @@
           <a:p>
             <a:fld id="{A5E9A43E-CFF9-48C3-B049-B9FA5E2E4F57}" type="datetime1">
               <a:rPr lang="en-US" smtClean="0"/>
-              <a:t>06-11-19</a:t>
+              <a:t>07-11-19</a:t>
             </a:fld>
             <a:endParaRPr lang="en-US" dirty="0"/>
           </a:p>
@@ -2823,7 +2829,7 @@
           <a:p>
             <a:fld id="{013D4D03-119E-4B95-90EB-03CB29F346AA}" type="datetime1">
               <a:rPr lang="en-US" smtClean="0"/>
-              <a:t>06-11-19</a:t>
+              <a:t>07-11-19</a:t>
             </a:fld>
             <a:endParaRPr lang="en-US" dirty="0"/>
           </a:p>
@@ -2936,7 +2942,7 @@
           <a:p>
             <a:fld id="{A027293F-426C-486A-945D-D5F33E5B14AB}" type="datetime1">
               <a:rPr lang="en-US" smtClean="0"/>
-              <a:t>06-11-19</a:t>
+              <a:t>07-11-19</a:t>
             </a:fld>
             <a:endParaRPr lang="en-US" dirty="0"/>
           </a:p>
@@ -3247,7 +3253,7 @@
           <a:p>
             <a:fld id="{8DC6A9D6-43D9-48BF-BAA3-41975785F0CB}" type="datetime1">
               <a:rPr lang="en-US" smtClean="0"/>
-              <a:t>06-11-19</a:t>
+              <a:t>07-11-19</a:t>
             </a:fld>
             <a:endParaRPr lang="en-US" dirty="0"/>
           </a:p>
@@ -3429,7 +3435,7 @@
           <a:p>
             <a:fld id="{AB814CEC-9F17-496B-99D6-DCE4BD5734FE}" type="datetimeFigureOut">
               <a:rPr lang="en-US" smtClean="0"/>
-              <a:t>06-11-19</a:t>
+              <a:t>07-11-19</a:t>
             </a:fld>
             <a:endParaRPr lang="en-US" dirty="0"/>
           </a:p>
@@ -3705,7 +3711,7 @@
           <a:p>
             <a:fld id="{AF73C7F7-F66F-4F95-8F3E-08CF18AC175D}" type="datetime1">
               <a:rPr lang="en-US" smtClean="0"/>
-              <a:t>06-11-19</a:t>
+              <a:t>07-11-19</a:t>
             </a:fld>
             <a:endParaRPr lang="en-US" dirty="0"/>
           </a:p>
@@ -3903,7 +3909,7 @@
           <a:p>
             <a:fld id="{061A801A-39E1-4A63-852A-1ED55567695B}" type="datetime1">
               <a:rPr lang="en-US" smtClean="0"/>
-              <a:t>06-11-19</a:t>
+              <a:t>07-11-19</a:t>
             </a:fld>
             <a:endParaRPr lang="en-US" dirty="0"/>
           </a:p>
@@ -4111,7 +4117,7 @@
           <a:p>
             <a:fld id="{744C8F9C-9F70-4A32-9C14-DB0721FED983}" type="datetime1">
               <a:rPr lang="en-US" smtClean="0"/>
-              <a:t>06-11-19</a:t>
+              <a:t>07-11-19</a:t>
             </a:fld>
             <a:endParaRPr lang="en-US" dirty="0"/>
           </a:p>
@@ -4369,7 +4375,7 @@
           <a:p>
             <a:fld id="{AB814CEC-9F17-496B-99D6-DCE4BD5734FE}" type="datetimeFigureOut">
               <a:rPr lang="en-US" smtClean="0"/>
-              <a:t>06-11-19</a:t>
+              <a:t>07-11-19</a:t>
             </a:fld>
             <a:endParaRPr lang="en-US" dirty="0"/>
           </a:p>
@@ -4601,7 +4607,7 @@
           <a:p>
             <a:fld id="{AB814CEC-9F17-496B-99D6-DCE4BD5734FE}" type="datetimeFigureOut">
               <a:rPr lang="en-US" smtClean="0"/>
-              <a:t>06-11-19</a:t>
+              <a:t>07-11-19</a:t>
             </a:fld>
             <a:endParaRPr lang="en-US" dirty="0"/>
           </a:p>
@@ -4968,7 +4974,7 @@
           <a:p>
             <a:fld id="{AB814CEC-9F17-496B-99D6-DCE4BD5734FE}" type="datetimeFigureOut">
               <a:rPr lang="en-US" smtClean="0"/>
-              <a:t>06-11-19</a:t>
+              <a:t>07-11-19</a:t>
             </a:fld>
             <a:endParaRPr lang="en-US" dirty="0"/>
           </a:p>
@@ -5086,7 +5092,7 @@
           <a:p>
             <a:fld id="{AB814CEC-9F17-496B-99D6-DCE4BD5734FE}" type="datetimeFigureOut">
               <a:rPr lang="en-US" smtClean="0"/>
-              <a:t>06-11-19</a:t>
+              <a:t>07-11-19</a:t>
             </a:fld>
             <a:endParaRPr lang="en-US" dirty="0"/>
           </a:p>
@@ -5181,7 +5187,7 @@
           <a:p>
             <a:fld id="{AB814CEC-9F17-496B-99D6-DCE4BD5734FE}" type="datetimeFigureOut">
               <a:rPr lang="en-US" smtClean="0"/>
-              <a:t>06-11-19</a:t>
+              <a:t>07-11-19</a:t>
             </a:fld>
             <a:endParaRPr lang="en-US" dirty="0"/>
           </a:p>
@@ -5458,7 +5464,7 @@
           <a:p>
             <a:fld id="{AB814CEC-9F17-496B-99D6-DCE4BD5734FE}" type="datetimeFigureOut">
               <a:rPr lang="en-US" smtClean="0"/>
-              <a:t>06-11-19</a:t>
+              <a:t>07-11-19</a:t>
             </a:fld>
             <a:endParaRPr lang="en-US" dirty="0"/>
           </a:p>
@@ -5711,7 +5717,7 @@
           <a:p>
             <a:fld id="{AB814CEC-9F17-496B-99D6-DCE4BD5734FE}" type="datetimeFigureOut">
               <a:rPr lang="en-US" smtClean="0"/>
-              <a:t>06-11-19</a:t>
+              <a:t>07-11-19</a:t>
             </a:fld>
             <a:endParaRPr lang="en-US" dirty="0"/>
           </a:p>
@@ -5924,7 +5930,7 @@
           <a:p>
             <a:fld id="{AB814CEC-9F17-496B-99D6-DCE4BD5734FE}" type="datetimeFigureOut">
               <a:rPr lang="en-US" smtClean="0"/>
-              <a:t>06-11-19</a:t>
+              <a:t>07-11-19</a:t>
             </a:fld>
             <a:endParaRPr lang="en-US" dirty="0"/>
           </a:p>
@@ -6489,7 +6495,7 @@
           <a:p>
             <a:fld id="{E5476EA0-6EC3-488A-9CFA-645165A5811E}" type="datetime1">
               <a:rPr lang="en-US" smtClean="0"/>
-              <a:t>06-11-19</a:t>
+              <a:t>07-11-19</a:t>
             </a:fld>
             <a:endParaRPr lang="en-US" dirty="0"/>
           </a:p>
@@ -7295,6 +7301,179 @@
 </p:sld>
 </file>
 
+<file path=ppt/slides/slide10.xml><?xml version="1.0" encoding="utf-8"?>
+<p:sld xmlns:a="http://schemas.openxmlformats.org/drawingml/2006/main" xmlns:r="http://schemas.openxmlformats.org/officeDocument/2006/relationships" xmlns:p="http://schemas.openxmlformats.org/presentationml/2006/main">
+  <p:cSld>
+    <p:spTree>
+      <p:nvGrpSpPr>
+        <p:cNvPr id="1" name=""/>
+        <p:cNvGrpSpPr/>
+        <p:nvPr/>
+      </p:nvGrpSpPr>
+      <p:grpSpPr>
+        <a:xfrm>
+          <a:off x="0" y="0"/>
+          <a:ext cx="0" cy="0"/>
+          <a:chOff x="0" y="0"/>
+          <a:chExt cx="0" cy="0"/>
+        </a:xfrm>
+      </p:grpSpPr>
+      <p:sp>
+        <p:nvSpPr>
+          <p:cNvPr id="2" name="Title 1"/>
+          <p:cNvSpPr>
+            <a:spLocks noGrp="1"/>
+          </p:cNvSpPr>
+          <p:nvPr>
+            <p:ph type="title"/>
+          </p:nvPr>
+        </p:nvSpPr>
+        <p:spPr>
+          <a:xfrm>
+            <a:off x="838200" y="365125"/>
+            <a:ext cx="9403080" cy="1325563"/>
+          </a:xfrm>
+        </p:spPr>
+        <p:txBody>
+          <a:bodyPr/>
+          <a:lstStyle/>
+          <a:p>
+            <a:pPr algn="ctr" rtl="1"/>
+            <a:r>
+              <a:rPr lang="he-IL" dirty="0" smtClean="0"/>
+              <a:t>להמשך:</a:t>
+            </a:r>
+            <a:endParaRPr lang="en-US" dirty="0"/>
+          </a:p>
+        </p:txBody>
+      </p:sp>
+      <p:sp>
+        <p:nvSpPr>
+          <p:cNvPr id="3" name="Content Placeholder 2"/>
+          <p:cNvSpPr>
+            <a:spLocks noGrp="1"/>
+          </p:cNvSpPr>
+          <p:nvPr>
+            <p:ph idx="1"/>
+          </p:nvPr>
+        </p:nvSpPr>
+        <p:spPr>
+          <a:xfrm>
+            <a:off x="838200" y="1825625"/>
+            <a:ext cx="9558528" cy="4351338"/>
+          </a:xfrm>
+        </p:spPr>
+        <p:txBody>
+          <a:bodyPr/>
+          <a:lstStyle/>
+          <a:p>
+            <a:pPr algn="r" rtl="1"/>
+            <a:r>
+              <a:rPr lang="he-IL" dirty="0" smtClean="0"/>
+              <a:t>הכנסת התוצאות שיש כרגע מהסימולציה לאלגוריתם קיים (3-</a:t>
+            </a:r>
+            <a:r>
+              <a:rPr lang="en-US" dirty="0" smtClean="0"/>
+              <a:t>NSGA</a:t>
+            </a:r>
+            <a:r>
+              <a:rPr lang="he-IL" dirty="0" smtClean="0"/>
+              <a:t> / </a:t>
+            </a:r>
+            <a:r>
+              <a:rPr lang="en-US" dirty="0" smtClean="0"/>
+              <a:t>MOEA</a:t>
+            </a:r>
+            <a:r>
+              <a:rPr lang="he-IL" dirty="0" smtClean="0"/>
+              <a:t>\</a:t>
+            </a:r>
+            <a:r>
+              <a:rPr lang="en-US" dirty="0" smtClean="0"/>
+              <a:t>D</a:t>
+            </a:r>
+            <a:r>
+              <a:rPr lang="he-IL" dirty="0" smtClean="0"/>
+              <a:t>) לקבלת תחושה/ תוצאות ראשונות </a:t>
+            </a:r>
+          </a:p>
+          <a:p>
+            <a:pPr algn="r" rtl="1"/>
+            <a:r>
+              <a:rPr lang="he-IL" dirty="0" smtClean="0"/>
+              <a:t>פיתוח אלגוריתם לאופטימיזציה</a:t>
+            </a:r>
+            <a:endParaRPr lang="en-US" dirty="0" smtClean="0"/>
+          </a:p>
+          <a:p>
+            <a:pPr algn="r" rtl="1"/>
+            <a:r>
+              <a:rPr lang="he-IL" dirty="0" smtClean="0"/>
+              <a:t>הכנסת תוצאות הסימולטור לאלגוריתם לימוד מכונה (</a:t>
+            </a:r>
+            <a:r>
+              <a:rPr lang="en-US" dirty="0" smtClean="0"/>
+              <a:t>SVM</a:t>
+            </a:r>
+            <a:r>
+              <a:rPr lang="he-IL" dirty="0" smtClean="0"/>
+              <a:t>/</a:t>
+            </a:r>
+            <a:r>
+              <a:rPr lang="en-US" dirty="0" smtClean="0"/>
+              <a:t>NN</a:t>
+            </a:r>
+            <a:r>
+              <a:rPr lang="he-IL" dirty="0" smtClean="0"/>
+              <a:t>) להשוואה</a:t>
+            </a:r>
+            <a:endParaRPr lang="en-US" dirty="0"/>
+          </a:p>
+        </p:txBody>
+      </p:sp>
+      <p:sp>
+        <p:nvSpPr>
+          <p:cNvPr id="4" name="Slide Number Placeholder 3"/>
+          <p:cNvSpPr>
+            <a:spLocks noGrp="1"/>
+          </p:cNvSpPr>
+          <p:nvPr>
+            <p:ph type="sldNum" sz="quarter" idx="12"/>
+          </p:nvPr>
+        </p:nvSpPr>
+        <p:spPr/>
+        <p:txBody>
+          <a:bodyPr/>
+          <a:lstStyle/>
+          <a:p>
+            <a:fld id="{46F73462-4705-4A44-BBF4-96DC5AF4F7E4}" type="slidenum">
+              <a:rPr lang="en-US" smtClean="0"/>
+              <a:t>10</a:t>
+            </a:fld>
+            <a:endParaRPr lang="en-US" dirty="0"/>
+          </a:p>
+        </p:txBody>
+      </p:sp>
+    </p:spTree>
+    <p:extLst>
+      <p:ext uri="{BB962C8B-B14F-4D97-AF65-F5344CB8AC3E}">
+        <p14:creationId xmlns:p14="http://schemas.microsoft.com/office/powerpoint/2010/main" val="3183284293"/>
+      </p:ext>
+    </p:extLst>
+  </p:cSld>
+  <p:clrMapOvr>
+    <a:masterClrMapping/>
+  </p:clrMapOvr>
+  <p:timing>
+    <p:tnLst>
+      <p:par>
+        <p:cTn id="1" dur="indefinite" restart="never" nodeType="tmRoot"/>
+      </p:par>
+    </p:tnLst>
+  </p:timing>
+</p:sld>
+</file>
+
 <file path=ppt/slides/slide2.xml><?xml version="1.0" encoding="utf-8"?>
 <p:sld xmlns:a="http://schemas.openxmlformats.org/drawingml/2006/main" xmlns:r="http://schemas.openxmlformats.org/officeDocument/2006/relationships" xmlns:p="http://schemas.openxmlformats.org/presentationml/2006/main">
   <p:cSld>
@@ -8039,7 +8218,7 @@
           <a:bodyPr/>
           <a:lstStyle/>
           <a:p>
-            <a:endParaRPr lang="en-US"/>
+            <a:endParaRPr lang="en-US" dirty="0"/>
           </a:p>
         </p:txBody>
       </p:sp>
@@ -8144,14 +8323,12 @@
         </p:nvSpPr>
         <p:spPr>
           <a:xfrm>
-            <a:off x="2050303" y="179512"/>
-            <a:ext cx="7146850" cy="1011518"/>
+            <a:off x="838200" y="0"/>
+            <a:ext cx="10515600" cy="1325563"/>
           </a:xfrm>
         </p:spPr>
         <p:txBody>
-          <a:bodyPr>
-            <a:normAutofit/>
-          </a:bodyPr>
+          <a:bodyPr/>
           <a:lstStyle/>
           <a:p>
             <a:pPr algn="ctr"/>
@@ -8163,173 +8340,141 @@
                   </a:schemeClr>
                 </a:solidFill>
               </a:rPr>
-              <a:t>Indices</a:t>
-            </a:r>
+              <a:t>Links Weights</a:t>
+            </a:r>
+            <a:endParaRPr lang="en-US" dirty="0"/>
+          </a:p>
+        </p:txBody>
+      </p:sp>
+      <p:sp>
+        <p:nvSpPr>
+          <p:cNvPr id="3" name="Content Placeholder 2"/>
+          <p:cNvSpPr>
+            <a:spLocks noGrp="1"/>
+          </p:cNvSpPr>
+          <p:nvPr>
+            <p:ph idx="1"/>
+          </p:nvPr>
+        </p:nvSpPr>
+        <p:spPr>
+          <a:xfrm>
+            <a:off x="838200" y="1225296"/>
+            <a:ext cx="10515600" cy="4951667"/>
+          </a:xfrm>
+        </p:spPr>
+        <p:txBody>
+          <a:bodyPr/>
+          <a:lstStyle/>
+          <a:p>
+            <a:r>
+              <a:rPr lang="en-US" sz="2000" dirty="0" smtClean="0"/>
+              <a:t>Take links length &amp; weight from 2 different manipulators: (UR5 &amp; </a:t>
+            </a:r>
+            <a:r>
+              <a:rPr lang="en-US" sz="2000" dirty="0" err="1" smtClean="0"/>
+              <a:t>Motoman</a:t>
+            </a:r>
+            <a:r>
+              <a:rPr lang="en-US" sz="2000" dirty="0" smtClean="0"/>
+              <a:t> NXC100)</a:t>
+            </a:r>
+          </a:p>
+          <a:p>
+            <a:r>
+              <a:rPr lang="en-US" sz="2000" dirty="0" smtClean="0"/>
+              <a:t>Get the ratio between the accumulated weight and accumulated length</a:t>
+            </a:r>
+          </a:p>
+          <a:p>
+            <a:pPr marL="0" indent="0">
+              <a:buNone/>
+            </a:pPr>
+            <a:r>
+              <a:rPr lang="en-US" sz="2000" dirty="0" smtClean="0"/>
+              <a:t>* Weight[i] = </a:t>
+            </a:r>
+            <a:r>
+              <a:rPr lang="en-US" sz="2000" dirty="0" err="1" smtClean="0"/>
+              <a:t>acc_length</a:t>
+            </a:r>
+            <a:r>
+              <a:rPr lang="en-US" sz="2000" dirty="0" smtClean="0"/>
+              <a:t>[i] * 8.79 + 4.29 –</a:t>
+            </a:r>
+            <a:r>
+              <a:rPr lang="en-US" sz="2000" dirty="0" err="1" smtClean="0"/>
+              <a:t>acc_weight</a:t>
+            </a:r>
+            <a:r>
+              <a:rPr lang="en-US" sz="2000" dirty="0" smtClean="0"/>
+              <a:t>[i-1] </a:t>
+            </a:r>
+          </a:p>
+          <a:p>
+            <a:pPr marL="0" indent="0">
+              <a:buNone/>
+            </a:pPr>
+            <a:endParaRPr lang="en-US" dirty="0"/>
+          </a:p>
+        </p:txBody>
+      </p:sp>
+      <p:sp>
+        <p:nvSpPr>
+          <p:cNvPr id="4" name="Slide Number Placeholder 3"/>
+          <p:cNvSpPr>
+            <a:spLocks noGrp="1"/>
+          </p:cNvSpPr>
+          <p:nvPr>
+            <p:ph type="sldNum" sz="quarter" idx="12"/>
+          </p:nvPr>
+        </p:nvSpPr>
+        <p:spPr/>
+        <p:txBody>
+          <a:bodyPr/>
+          <a:lstStyle/>
+          <a:p>
+            <a:fld id="{46F73462-4705-4A44-BBF4-96DC5AF4F7E4}" type="slidenum">
+              <a:rPr lang="en-US" smtClean="0"/>
+              <a:t>5</a:t>
+            </a:fld>
             <a:endParaRPr lang="en-US" dirty="0"/>
           </a:p>
         </p:txBody>
       </p:sp>
       <p:pic>
         <p:nvPicPr>
-          <p:cNvPr id="14" name="Content Placeholder 13"/>
+          <p:cNvPr id="6" name="Picture 5"/>
           <p:cNvPicPr>
-            <a:picLocks noGrp="1" noChangeAspect="1"/>
+            <a:picLocks noChangeAspect="1"/>
           </p:cNvPicPr>
-          <p:nvPr>
-            <p:ph idx="1"/>
-          </p:nvPr>
+          <p:nvPr/>
         </p:nvPicPr>
         <p:blipFill>
-          <a:blip r:embed="rId4"/>
+          <a:blip r:embed="rId2"/>
           <a:stretch>
             <a:fillRect/>
           </a:stretch>
         </p:blipFill>
         <p:spPr>
           <a:xfrm>
-            <a:off x="250762" y="1123950"/>
-            <a:ext cx="10349791" cy="4855368"/>
+            <a:off x="838200" y="2550859"/>
+            <a:ext cx="6988443" cy="3854387"/>
           </a:xfrm>
           <a:prstGeom prst="rect">
             <a:avLst/>
           </a:prstGeom>
         </p:spPr>
       </p:pic>
-      <p:sp>
-        <p:nvSpPr>
-          <p:cNvPr id="4" name="Slide Number Placeholder 3"/>
-          <p:cNvSpPr>
-            <a:spLocks noGrp="1"/>
-          </p:cNvSpPr>
-          <p:nvPr>
-            <p:ph type="sldNum" sz="quarter" idx="12"/>
-          </p:nvPr>
-        </p:nvSpPr>
-        <p:spPr/>
-        <p:txBody>
-          <a:bodyPr/>
-          <a:lstStyle/>
-          <a:p>
-            <a:pPr marL="0" marR="0" lvl="0" indent="0" algn="r" defTabSz="914400" rtl="0" eaLnBrk="1" fontAlgn="auto" latinLnBrk="0" hangingPunct="1">
-              <a:lnSpc>
-                <a:spcPct val="100000"/>
-              </a:lnSpc>
-              <a:spcBef>
-                <a:spcPts val="0"/>
-              </a:spcBef>
-              <a:spcAft>
-                <a:spcPts val="0"/>
-              </a:spcAft>
-              <a:buClrTx/>
-              <a:buSzTx/>
-              <a:buFontTx/>
-              <a:buNone/>
-              <a:tabLst/>
-              <a:defRPr/>
-            </a:pPr>
-            <a:fld id="{46F73462-4705-4A44-BBF4-96DC5AF4F7E4}" type="slidenum">
-              <a:rPr kumimoji="0" lang="en-US" sz="1400" b="0" i="0" u="none" strike="noStrike" kern="1200" cap="none" spc="0" normalizeH="0" baseline="0" noProof="0" smtClean="0">
-                <a:ln>
-                  <a:noFill/>
-                </a:ln>
-                <a:solidFill>
-                  <a:prstClr val="black">
-                    <a:tint val="75000"/>
-                  </a:prstClr>
-                </a:solidFill>
-                <a:effectLst/>
-                <a:uLnTx/>
-                <a:uFillTx/>
-                <a:latin typeface="Calibri" panose="020F0502020204030204"/>
-                <a:ea typeface="+mn-ea"/>
-                <a:cs typeface="+mn-cs"/>
-              </a:rPr>
-              <a:pPr marL="0" marR="0" lvl="0" indent="0" algn="r" defTabSz="914400" rtl="0" eaLnBrk="1" fontAlgn="auto" latinLnBrk="0" hangingPunct="1">
-                <a:lnSpc>
-                  <a:spcPct val="100000"/>
-                </a:lnSpc>
-                <a:spcBef>
-                  <a:spcPts val="0"/>
-                </a:spcBef>
-                <a:spcAft>
-                  <a:spcPts val="0"/>
-                </a:spcAft>
-                <a:buClrTx/>
-                <a:buSzTx/>
-                <a:buFontTx/>
-                <a:buNone/>
-                <a:tabLst/>
-                <a:defRPr/>
-              </a:pPr>
-              <a:t>5</a:t>
-            </a:fld>
-            <a:endParaRPr kumimoji="0" lang="en-US" sz="1200" b="0" i="0" u="none" strike="noStrike" kern="1200" cap="none" spc="0" normalizeH="0" baseline="0" noProof="0" dirty="0">
-              <a:ln>
-                <a:noFill/>
-              </a:ln>
-              <a:solidFill>
-                <a:prstClr val="black">
-                  <a:tint val="75000"/>
-                </a:prstClr>
-              </a:solidFill>
-              <a:effectLst/>
-              <a:uLnTx/>
-              <a:uFillTx/>
-              <a:latin typeface="Calibri" panose="020F0502020204030204"/>
-              <a:ea typeface="+mn-ea"/>
-              <a:cs typeface="+mn-cs"/>
-            </a:endParaRPr>
-          </a:p>
-        </p:txBody>
-      </p:sp>
-      <p:cxnSp>
-        <p:nvCxnSpPr>
-          <p:cNvPr id="16" name="Straight Connector 15"/>
-          <p:cNvCxnSpPr/>
-          <p:nvPr/>
-        </p:nvCxnSpPr>
-        <p:spPr>
-          <a:xfrm flipV="1">
-            <a:off x="2820199" y="3913632"/>
-            <a:ext cx="7406640" cy="27432"/>
-          </a:xfrm>
-          <a:prstGeom prst="line">
-            <a:avLst/>
-          </a:prstGeom>
-          <a:ln/>
-        </p:spPr>
-        <p:style>
-          <a:lnRef idx="3">
-            <a:schemeClr val="dk1"/>
-          </a:lnRef>
-          <a:fillRef idx="0">
-            <a:schemeClr val="dk1"/>
-          </a:fillRef>
-          <a:effectRef idx="2">
-            <a:schemeClr val="dk1"/>
-          </a:effectRef>
-          <a:fontRef idx="minor">
-            <a:schemeClr val="tx1"/>
-          </a:fontRef>
-        </p:style>
-      </p:cxnSp>
     </p:spTree>
     <p:extLst>
       <p:ext uri="{BB962C8B-B14F-4D97-AF65-F5344CB8AC3E}">
-        <p14:creationId xmlns:p14="http://schemas.microsoft.com/office/powerpoint/2010/main" val="1492200567"/>
+        <p14:creationId xmlns:p14="http://schemas.microsoft.com/office/powerpoint/2010/main" val="241167222"/>
       </p:ext>
     </p:extLst>
   </p:cSld>
   <p:clrMapOvr>
     <a:masterClrMapping/>
   </p:clrMapOvr>
-  <p:timing>
-    <p:tnLst>
-      <p:par>
-        <p:cTn id="1" dur="indefinite" restart="never" nodeType="tmRoot"/>
-      </p:par>
-    </p:tnLst>
-  </p:timing>
 </p:sld>
 </file>
 
@@ -8362,8 +8507,8 @@
         </p:nvSpPr>
         <p:spPr>
           <a:xfrm>
-            <a:off x="1367603" y="111750"/>
-            <a:ext cx="8596668" cy="1056830"/>
+            <a:off x="2050303" y="179512"/>
+            <a:ext cx="7146850" cy="1011518"/>
           </a:xfrm>
         </p:spPr>
         <p:txBody>
@@ -8374,244 +8519,45 @@
           <a:p>
             <a:pPr algn="ctr"/>
             <a:r>
-              <a:rPr lang="en-US" sz="4800" b="1" dirty="0">
+              <a:rPr lang="en-US" b="1" dirty="0" smtClean="0">
                 <a:solidFill>
                   <a:schemeClr val="accent6">
                     <a:lumMod val="75000"/>
                   </a:schemeClr>
                 </a:solidFill>
               </a:rPr>
-              <a:t>Manipulator Optimization</a:t>
-            </a:r>
-          </a:p>
-        </p:txBody>
-      </p:sp>
-      <p:sp>
-        <p:nvSpPr>
-          <p:cNvPr id="3" name="Content Placeholder 2"/>
-          <p:cNvSpPr>
-            <a:spLocks noGrp="1"/>
-          </p:cNvSpPr>
+              <a:t>Indices</a:t>
+            </a:r>
+            <a:endParaRPr lang="en-US" dirty="0"/>
+          </a:p>
+        </p:txBody>
+      </p:sp>
+      <p:pic>
+        <p:nvPicPr>
+          <p:cNvPr id="14" name="Content Placeholder 13"/>
+          <p:cNvPicPr>
+            <a:picLocks noGrp="1" noChangeAspect="1"/>
+          </p:cNvPicPr>
           <p:nvPr>
             <p:ph idx="1"/>
           </p:nvPr>
-        </p:nvSpPr>
+        </p:nvPicPr>
+        <p:blipFill>
+          <a:blip r:embed="rId3"/>
+          <a:stretch>
+            <a:fillRect/>
+          </a:stretch>
+        </p:blipFill>
         <p:spPr>
           <a:xfrm>
-            <a:off x="394944" y="914596"/>
-            <a:ext cx="9569327" cy="5822381"/>
+            <a:off x="250762" y="1123950"/>
+            <a:ext cx="10349791" cy="4855368"/>
           </a:xfrm>
+          <a:prstGeom prst="rect">
+            <a:avLst/>
+          </a:prstGeom>
         </p:spPr>
-        <p:txBody>
-          <a:bodyPr>
-            <a:noAutofit/>
-          </a:bodyPr>
-          <a:lstStyle/>
-          <a:p>
-            <a:pPr marL="0" indent="0">
-              <a:buNone/>
-            </a:pPr>
-            <a:r>
-              <a:rPr lang="en-US" sz="2400" b="1" u="sng" dirty="0"/>
-              <a:t>Objectives</a:t>
-            </a:r>
-            <a:r>
-              <a:rPr lang="en-US" sz="2400" b="1" dirty="0"/>
-              <a:t>:</a:t>
-            </a:r>
-          </a:p>
-          <a:p>
-            <a:pPr>
-              <a:buFont typeface="Wingdings" panose="05000000000000000000" pitchFamily="2" charset="2"/>
-              <a:buChar char="Ø"/>
-            </a:pPr>
-            <a:r>
-              <a:rPr lang="en-US" sz="2400" dirty="0"/>
-              <a:t>Min. Degrees of </a:t>
-            </a:r>
-            <a:r>
-              <a:rPr lang="en-US" sz="2400" dirty="0" smtClean="0"/>
-              <a:t>Freedom</a:t>
-            </a:r>
-            <a:r>
-              <a:rPr lang="en-US" sz="2400" dirty="0"/>
-              <a:t>\ </a:t>
-            </a:r>
-            <a:r>
-              <a:rPr lang="en-US" sz="2400" dirty="0"/>
-              <a:t>Degree of </a:t>
-            </a:r>
-            <a:r>
-              <a:rPr lang="en-US" sz="2400" dirty="0" smtClean="0"/>
-              <a:t>Redundancy [3 - 6 \ -3 – 0]</a:t>
-            </a:r>
-            <a:endParaRPr lang="en-US" sz="2400" dirty="0"/>
-          </a:p>
-          <a:p>
-            <a:pPr>
-              <a:buFont typeface="Wingdings" panose="05000000000000000000" pitchFamily="2" charset="2"/>
-              <a:buChar char="Ø"/>
-            </a:pPr>
-            <a:r>
-              <a:rPr lang="en-US" sz="2400" dirty="0"/>
-              <a:t>Min. </a:t>
-            </a:r>
-            <a:r>
-              <a:rPr lang="en-US" sz="2400" dirty="0"/>
-              <a:t>Cycle </a:t>
-            </a:r>
-            <a:r>
-              <a:rPr lang="en-US" sz="2400" dirty="0" smtClean="0"/>
-              <a:t>Time  [0-10]</a:t>
-            </a:r>
-            <a:endParaRPr lang="en-US" sz="2400" dirty="0"/>
-          </a:p>
-          <a:p>
-            <a:pPr>
-              <a:buFont typeface="Wingdings" panose="05000000000000000000" pitchFamily="2" charset="2"/>
-              <a:buChar char="Ø"/>
-            </a:pPr>
-            <a:r>
-              <a:rPr lang="en-US" sz="2400" dirty="0"/>
-              <a:t>Max manipulability\ Local Conditioning index  [</a:t>
-            </a:r>
-            <a:r>
-              <a:rPr lang="en-US" sz="2400" dirty="0" smtClean="0"/>
-              <a:t>0-1</a:t>
-            </a:r>
-            <a:r>
-              <a:rPr lang="en-US" sz="2400" dirty="0"/>
-              <a:t>]</a:t>
-            </a:r>
-          </a:p>
-          <a:p>
-            <a:pPr>
-              <a:buFont typeface="Wingdings" panose="05000000000000000000" pitchFamily="2" charset="2"/>
-              <a:buChar char="Ø"/>
-            </a:pPr>
-            <a:r>
-              <a:rPr lang="en-US" sz="2400" dirty="0" smtClean="0"/>
-              <a:t>Min  </a:t>
-            </a:r>
-            <a:r>
-              <a:rPr lang="en-US" sz="2400" dirty="0"/>
-              <a:t>z (Mid-Range Proximity</a:t>
-            </a:r>
-            <a:r>
-              <a:rPr lang="en-US" sz="2400" dirty="0" smtClean="0"/>
-              <a:t>)  [0 -?]</a:t>
-            </a:r>
-            <a:endParaRPr lang="en-US" sz="100" dirty="0"/>
-          </a:p>
-          <a:p>
-            <a:pPr marL="0" indent="0">
-              <a:buNone/>
-            </a:pPr>
-            <a:endParaRPr lang="en-US" sz="100" b="1" u="sng" dirty="0" smtClean="0"/>
-          </a:p>
-          <a:p>
-            <a:pPr marL="0" indent="0">
-              <a:buNone/>
-            </a:pPr>
-            <a:r>
-              <a:rPr lang="en-US" sz="2400" b="1" u="sng" dirty="0" smtClean="0"/>
-              <a:t>Independent variables :</a:t>
-            </a:r>
-            <a:endParaRPr lang="en-US" sz="2400" b="1" u="sng" dirty="0"/>
-          </a:p>
-          <a:p>
-            <a:pPr>
-              <a:buFont typeface="Wingdings" panose="05000000000000000000" pitchFamily="2" charset="2"/>
-              <a:buChar char="Ø"/>
-            </a:pPr>
-            <a:r>
-              <a:rPr lang="en-US" sz="2400" u="sng" dirty="0" smtClean="0"/>
-              <a:t>X1 : </a:t>
-            </a:r>
-            <a:r>
-              <a:rPr lang="en-US" sz="2400" u="sng" dirty="0" smtClean="0"/>
-              <a:t>Joints </a:t>
-            </a:r>
-            <a:r>
-              <a:rPr lang="en-US" sz="2400" u="sng" dirty="0"/>
-              <a:t>Types</a:t>
-            </a:r>
-            <a:r>
-              <a:rPr lang="en-US" sz="2400" dirty="0" smtClean="0"/>
-              <a:t>: array  [Roll, Pitch, Yaw]</a:t>
-            </a:r>
-            <a:endParaRPr lang="en-US" sz="2400" dirty="0"/>
-          </a:p>
-          <a:p>
-            <a:pPr>
-              <a:buFont typeface="Wingdings" panose="05000000000000000000" pitchFamily="2" charset="2"/>
-              <a:buChar char="Ø"/>
-            </a:pPr>
-            <a:r>
-              <a:rPr lang="en-US" sz="2400" u="sng" dirty="0" smtClean="0"/>
-              <a:t>X2: Previous </a:t>
-            </a:r>
-            <a:r>
-              <a:rPr lang="en-US" sz="2400" u="sng" dirty="0"/>
-              <a:t>axe </a:t>
-            </a:r>
-            <a:r>
-              <a:rPr lang="en-US" sz="2400" dirty="0" smtClean="0"/>
-              <a:t>: array [X , Y, Z]</a:t>
-            </a:r>
-          </a:p>
-          <a:p>
-            <a:pPr>
-              <a:buFont typeface="Wingdings" panose="05000000000000000000" pitchFamily="2" charset="2"/>
-              <a:buChar char="Ø"/>
-            </a:pPr>
-            <a:r>
-              <a:rPr lang="en-US" sz="2400" u="sng" dirty="0" smtClean="0"/>
-              <a:t>X3: Links Lengths</a:t>
-            </a:r>
-            <a:r>
-              <a:rPr lang="en-US" sz="2400" dirty="0" smtClean="0"/>
-              <a:t>: array [0.1  ,0.4,  0.7] (meters)</a:t>
-            </a:r>
-          </a:p>
-          <a:p>
-            <a:pPr>
-              <a:buFont typeface="Wingdings" panose="05000000000000000000" pitchFamily="2" charset="2"/>
-              <a:buChar char="Ø"/>
-            </a:pPr>
-            <a:r>
-              <a:rPr lang="en-US" sz="2400" u="sng" dirty="0" smtClean="0"/>
-              <a:t>X4: Number </a:t>
-            </a:r>
-            <a:r>
-              <a:rPr lang="en-US" sz="2400" u="sng" dirty="0"/>
-              <a:t>Degrees of Freedom</a:t>
-            </a:r>
-            <a:r>
-              <a:rPr lang="en-US" sz="2400" dirty="0" smtClean="0"/>
-              <a:t>: </a:t>
-            </a:r>
-            <a:r>
-              <a:rPr lang="en-US" sz="2400" dirty="0" smtClean="0"/>
-              <a:t>Int</a:t>
-            </a:r>
-            <a:r>
-              <a:rPr lang="en-US" sz="2400" dirty="0" smtClean="0"/>
-              <a:t> [3, 4, 5, 6]</a:t>
-            </a:r>
-            <a:endParaRPr lang="en-US" sz="2400" dirty="0"/>
-          </a:p>
-          <a:p>
-            <a:endParaRPr lang="en-US" sz="2400" dirty="0"/>
-          </a:p>
-          <a:p>
-            <a:endParaRPr lang="en-US" sz="2400" dirty="0"/>
-          </a:p>
-          <a:p>
-            <a:endParaRPr lang="en-US" sz="2400" dirty="0"/>
-          </a:p>
-        </p:txBody>
-      </p:sp>
+      </p:pic>
       <p:sp>
         <p:nvSpPr>
           <p:cNvPr id="4" name="Slide Number Placeholder 3"/>
@@ -8699,10 +8645,41 @@
           </a:p>
         </p:txBody>
       </p:sp>
+      <p:cxnSp>
+        <p:nvCxnSpPr>
+          <p:cNvPr id="16" name="Straight Connector 15"/>
+          <p:cNvCxnSpPr/>
+          <p:nvPr/>
+        </p:nvCxnSpPr>
+        <p:spPr>
+          <a:xfrm flipV="1">
+            <a:off x="2820199" y="3913632"/>
+            <a:ext cx="7406640" cy="27432"/>
+          </a:xfrm>
+          <a:prstGeom prst="line">
+            <a:avLst/>
+          </a:prstGeom>
+          <a:ln/>
+        </p:spPr>
+        <p:style>
+          <a:lnRef idx="3">
+            <a:schemeClr val="dk1"/>
+          </a:lnRef>
+          <a:fillRef idx="0">
+            <a:schemeClr val="dk1"/>
+          </a:fillRef>
+          <a:effectRef idx="2">
+            <a:schemeClr val="dk1"/>
+          </a:effectRef>
+          <a:fontRef idx="minor">
+            <a:schemeClr val="tx1"/>
+          </a:fontRef>
+        </p:style>
+      </p:cxnSp>
     </p:spTree>
     <p:extLst>
       <p:ext uri="{BB962C8B-B14F-4D97-AF65-F5344CB8AC3E}">
-        <p14:creationId xmlns:p14="http://schemas.microsoft.com/office/powerpoint/2010/main" val="1528865215"/>
+        <p14:creationId xmlns:p14="http://schemas.microsoft.com/office/powerpoint/2010/main" val="1492200567"/>
       </p:ext>
     </p:extLst>
   </p:cSld>
@@ -8748,8 +8725,8 @@
         </p:nvSpPr>
         <p:spPr>
           <a:xfrm>
-            <a:off x="838200" y="0"/>
-            <a:ext cx="10515600" cy="1171067"/>
+            <a:off x="1367603" y="111750"/>
+            <a:ext cx="8596668" cy="1056830"/>
           </a:xfrm>
         </p:spPr>
         <p:txBody>
@@ -8760,7 +8737,7 @@
           <a:p>
             <a:pPr algn="ctr"/>
             <a:r>
-              <a:rPr lang="en-US" b="1" dirty="0">
+              <a:rPr lang="en-US" sz="4800" b="1" dirty="0">
                 <a:solidFill>
                   <a:schemeClr val="accent6">
                     <a:lumMod val="75000"/>
@@ -8769,41 +8746,6 @@
               </a:rPr>
               <a:t>Manipulator Optimization</a:t>
             </a:r>
-            <a:r>
-              <a:rPr lang="en-US" sz="3200" b="1" dirty="0">
-                <a:solidFill>
-                  <a:schemeClr val="accent6">
-                    <a:lumMod val="75000"/>
-                  </a:schemeClr>
-                </a:solidFill>
-              </a:rPr>
-              <a:t> </a:t>
-            </a:r>
-            <a:r>
-              <a:rPr lang="en-US" dirty="0">
-                <a:solidFill>
-                  <a:srgbClr val="90C226"/>
-                </a:solidFill>
-              </a:rPr>
-              <a:t>(</a:t>
-            </a:r>
-            <a:r>
-              <a:rPr lang="en-US" dirty="0">
-                <a:solidFill>
-                  <a:srgbClr val="90C226"/>
-                </a:solidFill>
-              </a:rPr>
-              <a:t>cnt’d</a:t>
-            </a:r>
-            <a:r>
-              <a:rPr lang="en-US" dirty="0" smtClean="0">
-                <a:solidFill>
-                  <a:srgbClr val="90C226"/>
-                </a:solidFill>
-              </a:rPr>
-              <a:t>)</a:t>
-            </a:r>
-            <a:endParaRPr lang="en-US" dirty="0"/>
           </a:p>
         </p:txBody>
       </p:sp>
@@ -8819,13 +8761,13 @@
         </p:nvSpPr>
         <p:spPr>
           <a:xfrm>
-            <a:off x="774192" y="969264"/>
-            <a:ext cx="9768840" cy="5486400"/>
+            <a:off x="394944" y="914596"/>
+            <a:ext cx="9569327" cy="5822381"/>
           </a:xfrm>
         </p:spPr>
         <p:txBody>
           <a:bodyPr>
-            <a:normAutofit/>
+            <a:noAutofit/>
           </a:bodyPr>
           <a:lstStyle/>
           <a:p>
@@ -8833,363 +8775,277 @@
               <a:buNone/>
             </a:pPr>
             <a:r>
-              <a:rPr lang="en-US" b="1" u="sng" dirty="0" smtClean="0"/>
-              <a:t>Assumptions \ Constrains:</a:t>
-            </a:r>
-            <a:endParaRPr lang="en-US" b="1" u="sng" dirty="0"/>
-          </a:p>
-          <a:p>
-            <a:pPr marL="514350" indent="-514350">
-              <a:buFont typeface="+mj-lt"/>
-              <a:buAutoNum type="romanUcPeriod"/>
+              <a:rPr lang="en-US" sz="2400" b="1" u="sng" dirty="0"/>
+              <a:t>Objectives</a:t>
+            </a:r>
+            <a:r>
+              <a:rPr lang="en-US" sz="2400" b="1" dirty="0"/>
+              <a:t>:</a:t>
+            </a:r>
+          </a:p>
+          <a:p>
+            <a:pPr>
+              <a:buFont typeface="Wingdings" panose="05000000000000000000" pitchFamily="2" charset="2"/>
+              <a:buChar char="Ø"/>
             </a:pPr>
             <a:r>
-              <a:rPr lang="en-US" sz="2000" dirty="0">
+              <a:rPr lang="en-US" sz="2400" dirty="0"/>
+              <a:t>Min. Degrees of </a:t>
+            </a:r>
+            <a:r>
+              <a:rPr lang="en-US" sz="2400" dirty="0" smtClean="0"/>
+              <a:t>Freedom</a:t>
+            </a:r>
+            <a:r>
+              <a:rPr lang="en-US" sz="2400" dirty="0"/>
+              <a:t>\ Degree of </a:t>
+            </a:r>
+            <a:r>
+              <a:rPr lang="en-US" sz="2400" dirty="0" smtClean="0"/>
+              <a:t>Redundancy [3 - 6 \ -3 – 0]</a:t>
+            </a:r>
+            <a:endParaRPr lang="en-US" sz="2400" dirty="0"/>
+          </a:p>
+          <a:p>
+            <a:pPr>
+              <a:buFont typeface="Wingdings" panose="05000000000000000000" pitchFamily="2" charset="2"/>
+              <a:buChar char="Ø"/>
+            </a:pPr>
+            <a:r>
+              <a:rPr lang="en-US" sz="2400" dirty="0"/>
+              <a:t>Min. Cycle </a:t>
+            </a:r>
+            <a:r>
+              <a:rPr lang="en-US" sz="2400" dirty="0" smtClean="0"/>
+              <a:t>Time  [0-10]</a:t>
+            </a:r>
+            <a:endParaRPr lang="en-US" sz="2400" dirty="0"/>
+          </a:p>
+          <a:p>
+            <a:pPr>
+              <a:buFont typeface="Wingdings" panose="05000000000000000000" pitchFamily="2" charset="2"/>
+              <a:buChar char="Ø"/>
+            </a:pPr>
+            <a:r>
+              <a:rPr lang="en-US" sz="2400" dirty="0"/>
+              <a:t>Max manipulability\ Local Conditioning index  [</a:t>
+            </a:r>
+            <a:r>
+              <a:rPr lang="en-US" sz="2400" dirty="0" smtClean="0"/>
+              <a:t>0-1</a:t>
+            </a:r>
+            <a:r>
+              <a:rPr lang="en-US" sz="2400" dirty="0"/>
+              <a:t>]</a:t>
+            </a:r>
+          </a:p>
+          <a:p>
+            <a:pPr>
+              <a:buFont typeface="Wingdings" panose="05000000000000000000" pitchFamily="2" charset="2"/>
+              <a:buChar char="Ø"/>
+            </a:pPr>
+            <a:r>
+              <a:rPr lang="en-US" sz="2400" dirty="0" smtClean="0"/>
+              <a:t>Min  </a:t>
+            </a:r>
+            <a:r>
+              <a:rPr lang="en-US" sz="2400" dirty="0"/>
+              <a:t>z (Mid-Range Proximity</a:t>
+            </a:r>
+            <a:r>
+              <a:rPr lang="en-US" sz="2400" dirty="0" smtClean="0"/>
+              <a:t>)  [0 -?]</a:t>
+            </a:r>
+            <a:endParaRPr lang="en-US" sz="100" dirty="0"/>
+          </a:p>
+          <a:p>
+            <a:pPr marL="0" indent="0">
+              <a:buNone/>
+            </a:pPr>
+            <a:endParaRPr lang="en-US" sz="100" b="1" u="sng" dirty="0" smtClean="0"/>
+          </a:p>
+          <a:p>
+            <a:pPr marL="0" indent="0">
+              <a:buNone/>
+            </a:pPr>
+            <a:r>
+              <a:rPr lang="en-US" sz="2400" b="1" u="sng" dirty="0" smtClean="0"/>
+              <a:t>Independent variables :</a:t>
+            </a:r>
+            <a:endParaRPr lang="en-US" sz="2400" b="1" u="sng" dirty="0"/>
+          </a:p>
+          <a:p>
+            <a:pPr>
+              <a:buFont typeface="Wingdings" panose="05000000000000000000" pitchFamily="2" charset="2"/>
+              <a:buChar char="Ø"/>
+            </a:pPr>
+            <a:r>
+              <a:rPr lang="en-US" sz="2400" u="sng" dirty="0" smtClean="0"/>
+              <a:t>X1 : Joints </a:t>
+            </a:r>
+            <a:r>
+              <a:rPr lang="en-US" sz="2400" u="sng" dirty="0"/>
+              <a:t>Types</a:t>
+            </a:r>
+            <a:r>
+              <a:rPr lang="en-US" sz="2400" dirty="0" smtClean="0"/>
+              <a:t>: array  [Roll, Pitch, Yaw]</a:t>
+            </a:r>
+            <a:endParaRPr lang="en-US" sz="2400" dirty="0"/>
+          </a:p>
+          <a:p>
+            <a:pPr>
+              <a:buFont typeface="Wingdings" panose="05000000000000000000" pitchFamily="2" charset="2"/>
+              <a:buChar char="Ø"/>
+            </a:pPr>
+            <a:r>
+              <a:rPr lang="en-US" sz="2400" u="sng" dirty="0" smtClean="0"/>
+              <a:t>X2: Previous </a:t>
+            </a:r>
+            <a:r>
+              <a:rPr lang="en-US" sz="2400" u="sng" dirty="0"/>
+              <a:t>axe </a:t>
+            </a:r>
+            <a:r>
+              <a:rPr lang="en-US" sz="2400" dirty="0" smtClean="0"/>
+              <a:t>: array [X , Y, Z]</a:t>
+            </a:r>
+          </a:p>
+          <a:p>
+            <a:pPr>
+              <a:buFont typeface="Wingdings" panose="05000000000000000000" pitchFamily="2" charset="2"/>
+              <a:buChar char="Ø"/>
+            </a:pPr>
+            <a:r>
+              <a:rPr lang="en-US" sz="2400" u="sng" dirty="0" smtClean="0"/>
+              <a:t>X3: Links Lengths</a:t>
+            </a:r>
+            <a:r>
+              <a:rPr lang="en-US" sz="2400" dirty="0" smtClean="0"/>
+              <a:t>: array [0.1  ,0.4,  0.7] (meters)</a:t>
+            </a:r>
+          </a:p>
+          <a:p>
+            <a:pPr>
+              <a:buFont typeface="Wingdings" panose="05000000000000000000" pitchFamily="2" charset="2"/>
+              <a:buChar char="Ø"/>
+            </a:pPr>
+            <a:r>
+              <a:rPr lang="en-US" sz="2400" u="sng" dirty="0" smtClean="0"/>
+              <a:t>X4: Number </a:t>
+            </a:r>
+            <a:r>
+              <a:rPr lang="en-US" sz="2400" u="sng" dirty="0"/>
+              <a:t>Degrees of Freedom</a:t>
+            </a:r>
+            <a:r>
+              <a:rPr lang="en-US" sz="2400" dirty="0" smtClean="0"/>
+              <a:t>: Int [3, 4, 5, 6]</a:t>
+            </a:r>
+            <a:endParaRPr lang="en-US" sz="2400" dirty="0"/>
+          </a:p>
+          <a:p>
+            <a:endParaRPr lang="en-US" sz="2400" dirty="0"/>
+          </a:p>
+          <a:p>
+            <a:endParaRPr lang="en-US" sz="2400" dirty="0"/>
+          </a:p>
+          <a:p>
+            <a:endParaRPr lang="en-US" sz="2400" dirty="0"/>
+          </a:p>
+        </p:txBody>
+      </p:sp>
+      <p:sp>
+        <p:nvSpPr>
+          <p:cNvPr id="4" name="Slide Number Placeholder 3"/>
+          <p:cNvSpPr>
+            <a:spLocks noGrp="1"/>
+          </p:cNvSpPr>
+          <p:nvPr>
+            <p:ph type="sldNum" sz="quarter" idx="12"/>
+          </p:nvPr>
+        </p:nvSpPr>
+        <p:spPr/>
+        <p:txBody>
+          <a:bodyPr/>
+          <a:lstStyle/>
+          <a:p>
+            <a:pPr marL="0" marR="0" lvl="0" indent="0" algn="r" defTabSz="914400" rtl="0" eaLnBrk="1" fontAlgn="auto" latinLnBrk="0" hangingPunct="1">
+              <a:lnSpc>
+                <a:spcPct val="100000"/>
+              </a:lnSpc>
+              <a:spcBef>
+                <a:spcPts val="0"/>
+              </a:spcBef>
+              <a:spcAft>
+                <a:spcPts val="0"/>
+              </a:spcAft>
+              <a:buClrTx/>
+              <a:buSzTx/>
+              <a:buFontTx/>
+              <a:buNone/>
+              <a:tabLst/>
+              <a:defRPr/>
+            </a:pPr>
+            <a:fld id="{46F73462-4705-4A44-BBF4-96DC5AF4F7E4}" type="slidenum">
+              <a:rPr kumimoji="0" lang="en-US" sz="1400" b="0" i="0" u="none" strike="noStrike" kern="1200" cap="none" spc="0" normalizeH="0" baseline="0" noProof="0" smtClean="0">
+                <a:ln>
+                  <a:noFill/>
+                </a:ln>
                 <a:solidFill>
-                  <a:srgbClr val="00B050"/>
+                  <a:prstClr val="black">
+                    <a:tint val="75000"/>
+                  </a:prstClr>
                 </a:solidFill>
+                <a:effectLst/>
+                <a:uLnTx/>
+                <a:uFillTx/>
+                <a:latin typeface="Calibri" panose="020F0502020204030204"/>
+                <a:ea typeface="+mn-ea"/>
+                <a:cs typeface="+mn-cs"/>
               </a:rPr>
-              <a:t>First joint is rotational along Z </a:t>
-            </a:r>
-            <a:r>
-              <a:rPr lang="en-US" sz="2000" dirty="0" smtClean="0">
-                <a:solidFill>
-                  <a:srgbClr val="00B050"/>
-                </a:solidFill>
-              </a:rPr>
-              <a:t>axe:  X1[0</a:t>
-            </a:r>
-            <a:r>
-              <a:rPr lang="en-US" sz="2000" dirty="0">
-                <a:solidFill>
-                  <a:srgbClr val="00B050"/>
-                </a:solidFill>
-              </a:rPr>
-              <a:t>] = </a:t>
-            </a:r>
-            <a:r>
-              <a:rPr lang="en-US" sz="2000" dirty="0" smtClean="0">
-                <a:solidFill>
-                  <a:srgbClr val="00B050"/>
-                </a:solidFill>
-              </a:rPr>
-              <a:t>Roll, </a:t>
-            </a:r>
-            <a:r>
-              <a:rPr lang="en-US" sz="2000" dirty="0">
-                <a:solidFill>
-                  <a:srgbClr val="00B050"/>
-                </a:solidFill>
-              </a:rPr>
-              <a:t>X2[0] = </a:t>
-            </a:r>
-            <a:r>
-              <a:rPr lang="en-US" sz="2000" dirty="0" smtClean="0">
-                <a:solidFill>
-                  <a:srgbClr val="00B050"/>
-                </a:solidFill>
-              </a:rPr>
-              <a:t>Z</a:t>
-            </a:r>
-            <a:endParaRPr lang="en-US" sz="2000" dirty="0">
-              <a:solidFill>
-                <a:srgbClr val="00B050"/>
-              </a:solidFill>
-            </a:endParaRPr>
-          </a:p>
-          <a:p>
-            <a:pPr marL="514350" indent="-514350">
-              <a:buFont typeface="+mj-lt"/>
-              <a:buAutoNum type="romanUcPeriod"/>
-            </a:pPr>
-            <a:r>
-              <a:rPr lang="en-US" sz="2000" dirty="0">
-                <a:solidFill>
-                  <a:srgbClr val="00B050"/>
-                </a:solidFill>
-              </a:rPr>
-              <a:t>First link length = </a:t>
-            </a:r>
-            <a:r>
-              <a:rPr lang="en-US" sz="2000" dirty="0" smtClean="0">
-                <a:solidFill>
-                  <a:srgbClr val="00B050"/>
-                </a:solidFill>
-              </a:rPr>
-              <a:t>0.1m :   X3[0</a:t>
-            </a:r>
-            <a:r>
-              <a:rPr lang="en-US" sz="2000" dirty="0">
-                <a:solidFill>
-                  <a:srgbClr val="00B050"/>
-                </a:solidFill>
-              </a:rPr>
-              <a:t>]=</a:t>
-            </a:r>
-            <a:r>
-              <a:rPr lang="en-US" sz="2000" dirty="0" smtClean="0">
-                <a:solidFill>
-                  <a:srgbClr val="00B050"/>
-                </a:solidFill>
-              </a:rPr>
-              <a:t>0.1</a:t>
-            </a:r>
-            <a:endParaRPr lang="en-US" sz="2000" dirty="0">
-              <a:solidFill>
-                <a:srgbClr val="00B050"/>
-              </a:solidFill>
-            </a:endParaRPr>
-          </a:p>
-          <a:p>
-            <a:pPr marL="514350" indent="-514350">
-              <a:buFont typeface="+mj-lt"/>
-              <a:buAutoNum type="romanUcPeriod"/>
-            </a:pPr>
-            <a:r>
-              <a:rPr lang="en-US" sz="2000" dirty="0"/>
-              <a:t>Total length of all the links &gt; </a:t>
-            </a:r>
-            <a:r>
-              <a:rPr lang="en-US" sz="2000" dirty="0" smtClean="0"/>
-              <a:t>1m : </a:t>
-            </a:r>
-            <a:r>
-              <a:rPr lang="en-US" sz="2000" dirty="0"/>
-              <a:t>Sum (X3) &gt; </a:t>
-            </a:r>
-            <a:r>
-              <a:rPr lang="en-US" sz="2000" dirty="0" smtClean="0"/>
-              <a:t>1</a:t>
-            </a:r>
-            <a:endParaRPr lang="en-US" sz="2000" dirty="0"/>
-          </a:p>
-          <a:p>
-            <a:pPr marL="514350" indent="-514350">
-              <a:buFont typeface="+mj-lt"/>
-              <a:buAutoNum type="romanUcPeriod"/>
-            </a:pPr>
-            <a:r>
-              <a:rPr lang="en-US" sz="2000" dirty="0"/>
-              <a:t>2 adjacent prismatic joints must be perpendiculars</a:t>
-            </a:r>
-          </a:p>
-          <a:p>
-            <a:pPr marL="514350" indent="-514350">
-              <a:buFont typeface="+mj-lt"/>
-              <a:buAutoNum type="romanUcPeriod"/>
-            </a:pPr>
-            <a:r>
-              <a:rPr lang="en-US" sz="2000" dirty="0"/>
-              <a:t>No more than 3 prismatic </a:t>
-            </a:r>
-            <a:r>
-              <a:rPr lang="en-US" sz="2000" dirty="0" smtClean="0"/>
-              <a:t>joints</a:t>
-            </a:r>
-          </a:p>
-          <a:p>
-            <a:pPr marL="514350" indent="-514350">
-              <a:buFont typeface="+mj-lt"/>
-              <a:buAutoNum type="romanUcPeriod"/>
-            </a:pPr>
-            <a:r>
-              <a:rPr lang="en-US" sz="2000" dirty="0"/>
-              <a:t>After Roll joint can’t be </a:t>
-            </a:r>
-            <a:r>
-              <a:rPr lang="en-US" sz="2000" dirty="0" smtClean="0"/>
-              <a:t>Roll\Pitch </a:t>
-            </a:r>
-            <a:r>
-              <a:rPr lang="en-US" sz="2000" dirty="0"/>
-              <a:t>joint in the Z axe: If </a:t>
-            </a:r>
-            <a:r>
-              <a:rPr lang="en-US" sz="2000" dirty="0" smtClean="0"/>
-              <a:t>X1[</a:t>
-            </a:r>
-            <a:r>
-              <a:rPr lang="en-US" sz="2000" dirty="0" smtClean="0"/>
-              <a:t>i</a:t>
-            </a:r>
-            <a:r>
-              <a:rPr lang="en-US" sz="2000" dirty="0"/>
-              <a:t>]==Roll and </a:t>
-            </a:r>
-            <a:r>
-              <a:rPr lang="en-US" sz="2000" dirty="0" smtClean="0"/>
-              <a:t>(X1[i+1</a:t>
-            </a:r>
-            <a:r>
-              <a:rPr lang="en-US" sz="2000" dirty="0"/>
-              <a:t>]==</a:t>
-            </a:r>
-            <a:r>
-              <a:rPr lang="en-US" sz="2000" dirty="0" smtClean="0"/>
-              <a:t>Roll or X1[i+1]==Pitch) than X2[i+1</a:t>
-            </a:r>
-            <a:r>
-              <a:rPr lang="en-US" sz="2000" dirty="0"/>
-              <a:t>]!=</a:t>
-            </a:r>
-            <a:r>
-              <a:rPr lang="en-US" sz="2000" dirty="0" smtClean="0"/>
-              <a:t>Z</a:t>
-            </a:r>
-          </a:p>
-          <a:p>
-            <a:pPr marL="514350" indent="-514350">
-              <a:buFont typeface="+mj-lt"/>
-              <a:buAutoNum type="romanUcPeriod"/>
-            </a:pPr>
-            <a:r>
-              <a:rPr lang="en-US" sz="2000" dirty="0" smtClean="0"/>
-              <a:t>After Roll Joint or the following joints sequence [ Roll -&gt; </a:t>
-            </a:r>
-            <a:r>
-              <a:rPr lang="en-US" sz="2000" dirty="0" smtClean="0"/>
-              <a:t>Pris</a:t>
-            </a:r>
-            <a:r>
-              <a:rPr lang="en-US" sz="2000" dirty="0"/>
-              <a:t> </a:t>
-            </a:r>
-            <a:r>
-              <a:rPr lang="en-US" sz="2000" dirty="0" smtClean="0"/>
-              <a:t>Z] the next joint wont be in the X axe: if (X1[</a:t>
-            </a:r>
-            <a:r>
-              <a:rPr lang="en-US" sz="2000" dirty="0" err="1" smtClean="0"/>
-              <a:t>i</a:t>
-            </a:r>
-            <a:r>
-              <a:rPr lang="en-US" sz="2000" dirty="0"/>
-              <a:t>]==Roll </a:t>
-            </a:r>
-            <a:r>
-              <a:rPr lang="en-US" sz="2000" dirty="0" smtClean="0"/>
-              <a:t>or (X1[i-1]==Roll and </a:t>
-            </a:r>
-            <a:r>
-              <a:rPr lang="en-US" sz="2000" dirty="0"/>
-              <a:t>X1[</a:t>
-            </a:r>
-            <a:r>
-              <a:rPr lang="en-US" sz="2000" dirty="0" err="1"/>
-              <a:t>i</a:t>
-            </a:r>
-            <a:r>
-              <a:rPr lang="en-US" sz="2000" dirty="0" smtClean="0"/>
-              <a:t>]==</a:t>
-            </a:r>
-            <a:r>
-              <a:rPr lang="en-US" sz="2000" dirty="0"/>
-              <a:t> </a:t>
-            </a:r>
-            <a:r>
-              <a:rPr lang="en-US" sz="2000" dirty="0" err="1" smtClean="0"/>
-              <a:t>Pris</a:t>
-            </a:r>
-            <a:r>
-              <a:rPr lang="en-US" sz="2000" dirty="0" smtClean="0"/>
-              <a:t> and X2[</a:t>
-            </a:r>
-            <a:r>
-              <a:rPr lang="en-US" sz="2000" dirty="0" err="1" smtClean="0"/>
-              <a:t>i</a:t>
-            </a:r>
-            <a:r>
-              <a:rPr lang="en-US" sz="2000" dirty="0" smtClean="0"/>
-              <a:t>] == Z)) than X2[i+1]!=X </a:t>
-            </a:r>
-          </a:p>
-          <a:p>
-            <a:pPr marL="514350" indent="-514350">
-              <a:buFont typeface="+mj-lt"/>
-              <a:buAutoNum type="romanUcPeriod"/>
-            </a:pPr>
-            <a:r>
-              <a:rPr lang="en-US" sz="2000" dirty="0"/>
-              <a:t> </a:t>
-            </a:r>
-            <a:r>
-              <a:rPr lang="en-US" sz="2000" dirty="0" smtClean="0"/>
-              <a:t>Joints limits: for Roll\ Pitch [0-360°] and for </a:t>
-            </a:r>
-            <a:r>
-              <a:rPr lang="en-US" sz="2000" dirty="0" err="1" smtClean="0"/>
-              <a:t>Pris</a:t>
-            </a:r>
-            <a:r>
-              <a:rPr lang="en-US" sz="2000" dirty="0" smtClean="0"/>
-              <a:t> [0 – 2*link length]</a:t>
-            </a:r>
-            <a:endParaRPr lang="en-US" sz="2400" dirty="0" smtClean="0"/>
-          </a:p>
-          <a:p>
-            <a:pPr marL="514350" indent="-514350">
-              <a:buFont typeface="+mj-lt"/>
-              <a:buAutoNum type="romanUcPeriod"/>
-            </a:pPr>
-            <a:r>
-              <a:rPr lang="en-US" sz="2000" dirty="0" smtClean="0"/>
-              <a:t>Number Points of Detection:  4 -- </a:t>
-            </a:r>
-            <a:r>
-              <a:rPr lang="en-US" sz="2000" u="sng" dirty="0" smtClean="0"/>
-              <a:t>Success</a:t>
-            </a:r>
-            <a:r>
-              <a:rPr lang="en-US" sz="2000" dirty="0" smtClean="0"/>
-              <a:t> :need to reach to one of the 2 top points and to the middle and the lower points</a:t>
-            </a:r>
-          </a:p>
-          <a:p>
-            <a:pPr marL="514350" indent="-514350">
-              <a:buFont typeface="+mj-lt"/>
-              <a:buAutoNum type="romanUcPeriod"/>
-            </a:pPr>
-            <a:endParaRPr lang="en-US" sz="2400" dirty="0"/>
-          </a:p>
-          <a:p>
-            <a:pPr marL="514350" indent="-514350">
-              <a:buFont typeface="+mj-lt"/>
-              <a:buAutoNum type="romanUcPeriod"/>
-            </a:pPr>
-            <a:endParaRPr lang="en-US" dirty="0" smtClean="0"/>
-          </a:p>
-          <a:p>
-            <a:endParaRPr lang="en-US" dirty="0"/>
-          </a:p>
-        </p:txBody>
-      </p:sp>
-      <p:sp>
-        <p:nvSpPr>
-          <p:cNvPr id="4" name="Slide Number Placeholder 3"/>
-          <p:cNvSpPr>
-            <a:spLocks noGrp="1"/>
-          </p:cNvSpPr>
-          <p:nvPr>
-            <p:ph type="sldNum" sz="quarter" idx="12"/>
-          </p:nvPr>
-        </p:nvSpPr>
-        <p:spPr/>
-        <p:txBody>
-          <a:bodyPr/>
-          <a:lstStyle/>
-          <a:p>
-            <a:fld id="{46F73462-4705-4A44-BBF4-96DC5AF4F7E4}" type="slidenum">
-              <a:rPr lang="en-US" smtClean="0"/>
+              <a:pPr marL="0" marR="0" lvl="0" indent="0" algn="r" defTabSz="914400" rtl="0" eaLnBrk="1" fontAlgn="auto" latinLnBrk="0" hangingPunct="1">
+                <a:lnSpc>
+                  <a:spcPct val="100000"/>
+                </a:lnSpc>
+                <a:spcBef>
+                  <a:spcPts val="0"/>
+                </a:spcBef>
+                <a:spcAft>
+                  <a:spcPts val="0"/>
+                </a:spcAft>
+                <a:buClrTx/>
+                <a:buSzTx/>
+                <a:buFontTx/>
+                <a:buNone/>
+                <a:tabLst/>
+                <a:defRPr/>
+              </a:pPr>
               <a:t>7</a:t>
             </a:fld>
-            <a:endParaRPr lang="en-US" dirty="0"/>
+            <a:endParaRPr kumimoji="0" lang="en-US" sz="1200" b="0" i="0" u="none" strike="noStrike" kern="1200" cap="none" spc="0" normalizeH="0" baseline="0" noProof="0" dirty="0">
+              <a:ln>
+                <a:noFill/>
+              </a:ln>
+              <a:solidFill>
+                <a:prstClr val="black">
+                  <a:tint val="75000"/>
+                </a:prstClr>
+              </a:solidFill>
+              <a:effectLst/>
+              <a:uLnTx/>
+              <a:uFillTx/>
+              <a:latin typeface="Calibri" panose="020F0502020204030204"/>
+              <a:ea typeface="+mn-ea"/>
+              <a:cs typeface="+mn-cs"/>
+            </a:endParaRPr>
           </a:p>
         </p:txBody>
       </p:sp>
     </p:spTree>
     <p:extLst>
       <p:ext uri="{BB962C8B-B14F-4D97-AF65-F5344CB8AC3E}">
-        <p14:creationId xmlns:p14="http://schemas.microsoft.com/office/powerpoint/2010/main" val="1814214600"/>
+        <p14:creationId xmlns:p14="http://schemas.microsoft.com/office/powerpoint/2010/main" val="1528865215"/>
       </p:ext>
     </p:extLst>
   </p:cSld>
@@ -9233,62 +9089,375 @@
             <p:ph type="title"/>
           </p:nvPr>
         </p:nvSpPr>
-        <p:spPr/>
-        <p:txBody>
-          <a:bodyPr/>
-          <a:lstStyle/>
-          <a:p>
-            <a:pPr algn="ctr"/>
-            <a:r>
-              <a:rPr lang="he-IL" dirty="0" smtClean="0"/>
-              <a:t>דברים אחרים</a:t>
-            </a:r>
-            <a:endParaRPr lang="en-US" dirty="0"/>
-          </a:p>
-        </p:txBody>
-      </p:sp>
-      <p:sp>
-        <p:nvSpPr>
-          <p:cNvPr id="3" name="Content Placeholder 2"/>
-          <p:cNvSpPr>
-            <a:spLocks noGrp="1"/>
-          </p:cNvSpPr>
-          <p:nvPr>
-            <p:ph idx="1"/>
-          </p:nvPr>
-        </p:nvSpPr>
         <p:spPr>
           <a:xfrm>
-            <a:off x="838200" y="1825625"/>
-            <a:ext cx="9265920" cy="4351338"/>
+            <a:off x="838200" y="0"/>
+            <a:ext cx="10515600" cy="1171067"/>
           </a:xfrm>
         </p:spPr>
         <p:txBody>
-          <a:bodyPr/>
-          <a:lstStyle/>
-          <a:p>
-            <a:pPr algn="r" rtl="1"/>
-            <a:r>
-              <a:rPr lang="he-IL" dirty="0" smtClean="0"/>
-              <a:t>האם אלגוריתם האופטימיזציה חייב לקרוא לסימולטור באונליין או שניתן להשתמש בתוצאות שיש?</a:t>
-            </a:r>
-          </a:p>
-          <a:p>
-            <a:pPr algn="r" rtl="1"/>
-            <a:r>
-              <a:rPr lang="he-IL" dirty="0" smtClean="0"/>
-              <a:t>אישור אביטל כמנחה: נשלחה תזכורת נוספת לאורית ב6.11</a:t>
-            </a:r>
-          </a:p>
-          <a:p>
-            <a:pPr algn="r" rtl="1"/>
-            <a:r>
-              <a:rPr lang="he-IL" dirty="0" smtClean="0"/>
-              <a:t>הגשת שאלת מחקר?</a:t>
-            </a:r>
-          </a:p>
-          <a:p>
-            <a:pPr algn="r" rtl="1"/>
+          <a:bodyPr>
+            <a:normAutofit/>
+          </a:bodyPr>
+          <a:lstStyle/>
+          <a:p>
+            <a:pPr algn="ctr"/>
+            <a:r>
+              <a:rPr lang="en-US" b="1" dirty="0">
+                <a:solidFill>
+                  <a:schemeClr val="accent6">
+                    <a:lumMod val="75000"/>
+                  </a:schemeClr>
+                </a:solidFill>
+              </a:rPr>
+              <a:t>Manipulator Optimization</a:t>
+            </a:r>
+            <a:r>
+              <a:rPr lang="en-US" sz="3200" b="1" dirty="0">
+                <a:solidFill>
+                  <a:schemeClr val="accent6">
+                    <a:lumMod val="75000"/>
+                  </a:schemeClr>
+                </a:solidFill>
+              </a:rPr>
+              <a:t> </a:t>
+            </a:r>
+            <a:r>
+              <a:rPr lang="en-US" dirty="0">
+                <a:solidFill>
+                  <a:srgbClr val="90C226"/>
+                </a:solidFill>
+              </a:rPr>
+              <a:t>(cnt’d</a:t>
+            </a:r>
+            <a:r>
+              <a:rPr lang="en-US" dirty="0" smtClean="0">
+                <a:solidFill>
+                  <a:srgbClr val="90C226"/>
+                </a:solidFill>
+              </a:rPr>
+              <a:t>)</a:t>
+            </a:r>
+            <a:endParaRPr lang="en-US" dirty="0"/>
+          </a:p>
+        </p:txBody>
+      </p:sp>
+      <p:sp>
+        <p:nvSpPr>
+          <p:cNvPr id="3" name="Content Placeholder 2"/>
+          <p:cNvSpPr>
+            <a:spLocks noGrp="1"/>
+          </p:cNvSpPr>
+          <p:nvPr>
+            <p:ph idx="1"/>
+          </p:nvPr>
+        </p:nvSpPr>
+        <p:spPr>
+          <a:xfrm>
+            <a:off x="774192" y="969264"/>
+            <a:ext cx="9768840" cy="5486400"/>
+          </a:xfrm>
+        </p:spPr>
+        <p:txBody>
+          <a:bodyPr>
+            <a:normAutofit/>
+          </a:bodyPr>
+          <a:lstStyle/>
+          <a:p>
+            <a:pPr marL="0" indent="0">
+              <a:buNone/>
+            </a:pPr>
+            <a:r>
+              <a:rPr lang="en-US" b="1" u="sng" dirty="0" smtClean="0"/>
+              <a:t>Assumptions \ Constrains:</a:t>
+            </a:r>
+            <a:endParaRPr lang="en-US" b="1" u="sng" dirty="0"/>
+          </a:p>
+          <a:p>
+            <a:pPr marL="514350" indent="-514350">
+              <a:buFont typeface="+mj-lt"/>
+              <a:buAutoNum type="romanUcPeriod"/>
+            </a:pPr>
+            <a:r>
+              <a:rPr lang="en-US" sz="2000" dirty="0">
+                <a:solidFill>
+                  <a:srgbClr val="00B050"/>
+                </a:solidFill>
+              </a:rPr>
+              <a:t>First joint is rotational along Z </a:t>
+            </a:r>
+            <a:r>
+              <a:rPr lang="en-US" sz="2000" dirty="0" smtClean="0">
+                <a:solidFill>
+                  <a:srgbClr val="00B050"/>
+                </a:solidFill>
+              </a:rPr>
+              <a:t>axe:  X1[0</a:t>
+            </a:r>
+            <a:r>
+              <a:rPr lang="en-US" sz="2000" dirty="0">
+                <a:solidFill>
+                  <a:srgbClr val="00B050"/>
+                </a:solidFill>
+              </a:rPr>
+              <a:t>] = </a:t>
+            </a:r>
+            <a:r>
+              <a:rPr lang="en-US" sz="2000" dirty="0" smtClean="0">
+                <a:solidFill>
+                  <a:srgbClr val="00B050"/>
+                </a:solidFill>
+              </a:rPr>
+              <a:t>Roll, </a:t>
+            </a:r>
+            <a:r>
+              <a:rPr lang="en-US" sz="2000" dirty="0">
+                <a:solidFill>
+                  <a:srgbClr val="00B050"/>
+                </a:solidFill>
+              </a:rPr>
+              <a:t>X2[0] = </a:t>
+            </a:r>
+            <a:r>
+              <a:rPr lang="en-US" sz="2000" dirty="0" smtClean="0">
+                <a:solidFill>
+                  <a:srgbClr val="00B050"/>
+                </a:solidFill>
+              </a:rPr>
+              <a:t>Z</a:t>
+            </a:r>
+            <a:endParaRPr lang="en-US" sz="2000" dirty="0">
+              <a:solidFill>
+                <a:srgbClr val="00B050"/>
+              </a:solidFill>
+            </a:endParaRPr>
+          </a:p>
+          <a:p>
+            <a:pPr marL="514350" indent="-514350">
+              <a:buFont typeface="+mj-lt"/>
+              <a:buAutoNum type="romanUcPeriod"/>
+            </a:pPr>
+            <a:r>
+              <a:rPr lang="en-US" sz="2000" dirty="0">
+                <a:solidFill>
+                  <a:srgbClr val="00B050"/>
+                </a:solidFill>
+              </a:rPr>
+              <a:t>First link length = </a:t>
+            </a:r>
+            <a:r>
+              <a:rPr lang="en-US" sz="2000" dirty="0" smtClean="0">
+                <a:solidFill>
+                  <a:srgbClr val="00B050"/>
+                </a:solidFill>
+              </a:rPr>
+              <a:t>0.1m :   X3[0</a:t>
+            </a:r>
+            <a:r>
+              <a:rPr lang="en-US" sz="2000" dirty="0">
+                <a:solidFill>
+                  <a:srgbClr val="00B050"/>
+                </a:solidFill>
+              </a:rPr>
+              <a:t>]=</a:t>
+            </a:r>
+            <a:r>
+              <a:rPr lang="en-US" sz="2000" dirty="0" smtClean="0">
+                <a:solidFill>
+                  <a:srgbClr val="00B050"/>
+                </a:solidFill>
+              </a:rPr>
+              <a:t>0.1</a:t>
+            </a:r>
+            <a:endParaRPr lang="en-US" sz="2000" dirty="0">
+              <a:solidFill>
+                <a:srgbClr val="00B050"/>
+              </a:solidFill>
+            </a:endParaRPr>
+          </a:p>
+          <a:p>
+            <a:pPr marL="514350" indent="-514350">
+              <a:buFont typeface="+mj-lt"/>
+              <a:buAutoNum type="romanUcPeriod"/>
+            </a:pPr>
+            <a:r>
+              <a:rPr lang="en-US" sz="2000" dirty="0"/>
+              <a:t>Total length of all the links &gt; </a:t>
+            </a:r>
+            <a:r>
+              <a:rPr lang="en-US" sz="2000" dirty="0" smtClean="0"/>
+              <a:t>1m : </a:t>
+            </a:r>
+            <a:r>
+              <a:rPr lang="en-US" sz="2000" dirty="0"/>
+              <a:t>Sum (X3) &gt; </a:t>
+            </a:r>
+            <a:r>
+              <a:rPr lang="en-US" sz="2000" dirty="0" smtClean="0"/>
+              <a:t>1</a:t>
+            </a:r>
+            <a:endParaRPr lang="en-US" sz="2000" dirty="0"/>
+          </a:p>
+          <a:p>
+            <a:pPr marL="514350" indent="-514350">
+              <a:buFont typeface="+mj-lt"/>
+              <a:buAutoNum type="romanUcPeriod"/>
+            </a:pPr>
+            <a:r>
+              <a:rPr lang="en-US" sz="2000" dirty="0"/>
+              <a:t>2 adjacent prismatic joints must be perpendiculars</a:t>
+            </a:r>
+          </a:p>
+          <a:p>
+            <a:pPr marL="514350" indent="-514350">
+              <a:buFont typeface="+mj-lt"/>
+              <a:buAutoNum type="romanUcPeriod"/>
+            </a:pPr>
+            <a:r>
+              <a:rPr lang="en-US" sz="2000" dirty="0"/>
+              <a:t>No more than 3 prismatic </a:t>
+            </a:r>
+            <a:r>
+              <a:rPr lang="en-US" sz="2000" dirty="0" smtClean="0"/>
+              <a:t>joints</a:t>
+            </a:r>
+          </a:p>
+          <a:p>
+            <a:pPr marL="514350" indent="-514350">
+              <a:buFont typeface="+mj-lt"/>
+              <a:buAutoNum type="romanUcPeriod"/>
+            </a:pPr>
+            <a:r>
+              <a:rPr lang="en-US" sz="2000" dirty="0"/>
+              <a:t>After Roll joint can’t be </a:t>
+            </a:r>
+            <a:r>
+              <a:rPr lang="en-US" sz="2000" dirty="0" smtClean="0"/>
+              <a:t>Roll\Pitch </a:t>
+            </a:r>
+            <a:r>
+              <a:rPr lang="en-US" sz="2000" dirty="0"/>
+              <a:t>joint in the Z axe: If </a:t>
+            </a:r>
+            <a:r>
+              <a:rPr lang="en-US" sz="2000" dirty="0" smtClean="0"/>
+              <a:t>X1[i</a:t>
+            </a:r>
+            <a:r>
+              <a:rPr lang="en-US" sz="2000" dirty="0"/>
+              <a:t>]==Roll and </a:t>
+            </a:r>
+            <a:r>
+              <a:rPr lang="en-US" sz="2000" dirty="0" smtClean="0"/>
+              <a:t>(X1[i+1</a:t>
+            </a:r>
+            <a:r>
+              <a:rPr lang="en-US" sz="2000" dirty="0"/>
+              <a:t>]==</a:t>
+            </a:r>
+            <a:r>
+              <a:rPr lang="en-US" sz="2000" dirty="0" smtClean="0"/>
+              <a:t>Roll or X1[i+1]==Pitch) than X2[i+1</a:t>
+            </a:r>
+            <a:r>
+              <a:rPr lang="en-US" sz="2000" dirty="0"/>
+              <a:t>]!=</a:t>
+            </a:r>
+            <a:r>
+              <a:rPr lang="en-US" sz="2000" dirty="0" smtClean="0"/>
+              <a:t>Z</a:t>
+            </a:r>
+          </a:p>
+          <a:p>
+            <a:pPr marL="514350" indent="-514350">
+              <a:buFont typeface="+mj-lt"/>
+              <a:buAutoNum type="romanUcPeriod"/>
+            </a:pPr>
+            <a:r>
+              <a:rPr lang="en-US" sz="2000" dirty="0" smtClean="0"/>
+              <a:t>After Roll Joint or the following joints sequence [ Roll -&gt; Pris</a:t>
+            </a:r>
+            <a:r>
+              <a:rPr lang="en-US" sz="2000" dirty="0"/>
+              <a:t> </a:t>
+            </a:r>
+            <a:r>
+              <a:rPr lang="en-US" sz="2000" dirty="0" smtClean="0"/>
+              <a:t>Z] the next joint wont be in the X axe: if (X1[i</a:t>
+            </a:r>
+            <a:r>
+              <a:rPr lang="en-US" sz="2000" dirty="0"/>
+              <a:t>]==Roll </a:t>
+            </a:r>
+            <a:r>
+              <a:rPr lang="en-US" sz="2000" dirty="0" smtClean="0"/>
+              <a:t>or (X1[i-1]==Roll and </a:t>
+            </a:r>
+            <a:r>
+              <a:rPr lang="en-US" sz="2000" dirty="0"/>
+              <a:t>X1[i</a:t>
+            </a:r>
+            <a:r>
+              <a:rPr lang="en-US" sz="2000" dirty="0" smtClean="0"/>
+              <a:t>]==</a:t>
+            </a:r>
+            <a:r>
+              <a:rPr lang="en-US" sz="2000" dirty="0"/>
+              <a:t> </a:t>
+            </a:r>
+            <a:r>
+              <a:rPr lang="en-US" sz="2000" dirty="0" smtClean="0"/>
+              <a:t>Pris and X2[i] == Z)) than X2[i+1]!=X </a:t>
+            </a:r>
+          </a:p>
+          <a:p>
+            <a:pPr marL="514350" indent="-514350">
+              <a:buFont typeface="+mj-lt"/>
+              <a:buAutoNum type="romanUcPeriod"/>
+            </a:pPr>
+            <a:r>
+              <a:rPr lang="en-US" sz="2000" dirty="0"/>
+              <a:t> </a:t>
+            </a:r>
+            <a:r>
+              <a:rPr lang="en-US" sz="2000" dirty="0" smtClean="0"/>
+              <a:t>Joints limits: for Roll\ Pitch [0-360°] and for Pris [0 – 2*link length]</a:t>
+            </a:r>
+            <a:endParaRPr lang="en-US" sz="2400" dirty="0" smtClean="0"/>
+          </a:p>
+          <a:p>
+            <a:pPr marL="514350" indent="-514350">
+              <a:buFont typeface="+mj-lt"/>
+              <a:buAutoNum type="romanUcPeriod"/>
+            </a:pPr>
+            <a:r>
+              <a:rPr lang="en-US" sz="2000" dirty="0" smtClean="0"/>
+              <a:t>Number Points of Detection:  4 -- </a:t>
+            </a:r>
+            <a:r>
+              <a:rPr lang="en-US" sz="2000" u="sng" dirty="0" smtClean="0"/>
+              <a:t>Success</a:t>
+            </a:r>
+            <a:r>
+              <a:rPr lang="en-US" sz="2000" dirty="0" smtClean="0"/>
+              <a:t> :need to reach to one of the 2 top points and to the middle and the lower points</a:t>
+            </a:r>
+          </a:p>
+          <a:p>
+            <a:pPr marL="514350" indent="-514350">
+              <a:buFont typeface="+mj-lt"/>
+              <a:buAutoNum type="romanUcPeriod"/>
+            </a:pPr>
+            <a:endParaRPr lang="en-US" sz="2400" dirty="0"/>
+          </a:p>
+          <a:p>
+            <a:pPr marL="514350" indent="-514350">
+              <a:buFont typeface="+mj-lt"/>
+              <a:buAutoNum type="romanUcPeriod"/>
+            </a:pPr>
+            <a:endParaRPr lang="en-US" dirty="0" smtClean="0"/>
+          </a:p>
+          <a:p>
             <a:endParaRPr lang="en-US" dirty="0"/>
           </a:p>
         </p:txBody>
@@ -9319,7 +9488,7 @@
     </p:spTree>
     <p:extLst>
       <p:ext uri="{BB962C8B-B14F-4D97-AF65-F5344CB8AC3E}">
-        <p14:creationId xmlns:p14="http://schemas.microsoft.com/office/powerpoint/2010/main" val="2215701404"/>
+        <p14:creationId xmlns:p14="http://schemas.microsoft.com/office/powerpoint/2010/main" val="1814214600"/>
       </p:ext>
     </p:extLst>
   </p:cSld>
@@ -9363,20 +9532,15 @@
             <p:ph type="title"/>
           </p:nvPr>
         </p:nvSpPr>
-        <p:spPr>
-          <a:xfrm>
-            <a:off x="838200" y="365125"/>
-            <a:ext cx="9403080" cy="1325563"/>
-          </a:xfrm>
-        </p:spPr>
-        <p:txBody>
-          <a:bodyPr/>
-          <a:lstStyle/>
-          <a:p>
-            <a:pPr algn="ctr" rtl="1"/>
+        <p:spPr/>
+        <p:txBody>
+          <a:bodyPr/>
+          <a:lstStyle/>
+          <a:p>
+            <a:pPr algn="ctr"/>
             <a:r>
               <a:rPr lang="he-IL" dirty="0" smtClean="0"/>
-              <a:t>להמשך:</a:t>
+              <a:t>דברים אחרים</a:t>
             </a:r>
             <a:endParaRPr lang="en-US" dirty="0"/>
           </a:p>
@@ -9395,7 +9559,7 @@
         <p:spPr>
           <a:xfrm>
             <a:off x="838200" y="1825625"/>
-            <a:ext cx="9558528" cy="4351338"/>
+            <a:ext cx="9265920" cy="4351338"/>
           </a:xfrm>
         </p:spPr>
         <p:txBody>
@@ -9405,63 +9569,25 @@
             <a:pPr algn="r" rtl="1"/>
             <a:r>
               <a:rPr lang="he-IL" dirty="0" smtClean="0"/>
-              <a:t>הכנסת התוצאות שיש כרגע מהסימולציה לאלגוריתם קיים (3-</a:t>
-            </a:r>
-            <a:r>
-              <a:rPr lang="en-US" dirty="0" smtClean="0"/>
-              <a:t>NSGA</a:t>
-            </a:r>
+              <a:t>האם אלגוריתם האופטימיזציה חייב לקרוא לסימולטור באונליין או שניתן להשתמש בתוצאות שיש?</a:t>
+            </a:r>
+          </a:p>
+          <a:p>
+            <a:pPr algn="r" rtl="1"/>
             <a:r>
               <a:rPr lang="he-IL" dirty="0" smtClean="0"/>
-              <a:t> / </a:t>
-            </a:r>
-            <a:r>
-              <a:rPr lang="en-US" dirty="0" smtClean="0"/>
-              <a:t>MOEA</a:t>
-            </a:r>
+              <a:t>אישור אביטל כמנחה: נשלחה תזכורת נוספת לאורית ב6.11</a:t>
+            </a:r>
+          </a:p>
+          <a:p>
+            <a:pPr algn="r" rtl="1"/>
             <a:r>
               <a:rPr lang="he-IL" dirty="0" smtClean="0"/>
-              <a:t>\</a:t>
-            </a:r>
-            <a:r>
-              <a:rPr lang="en-US" dirty="0" smtClean="0"/>
-              <a:t>D</a:t>
-            </a:r>
-            <a:r>
-              <a:rPr lang="he-IL" dirty="0" smtClean="0"/>
-              <a:t>) לקבלת תחושה/ תוצאות ראשונות </a:t>
+              <a:t>הגשת שאלת מחקר?</a:t>
             </a:r>
           </a:p>
           <a:p>
             <a:pPr algn="r" rtl="1"/>
-            <a:r>
-              <a:rPr lang="he-IL" dirty="0" smtClean="0"/>
-              <a:t>פיתוח אלגוריתם לאופטימיזציה</a:t>
-            </a:r>
-            <a:endParaRPr lang="en-US" dirty="0" smtClean="0"/>
-          </a:p>
-          <a:p>
-            <a:pPr algn="r" rtl="1"/>
-            <a:r>
-              <a:rPr lang="he-IL" dirty="0" smtClean="0"/>
-              <a:t>הכנסת תוצאות הסימולטור לאלגוריתם לימוד מכונה (</a:t>
-            </a:r>
-            <a:r>
-              <a:rPr lang="en-US" dirty="0" smtClean="0"/>
-              <a:t>SVM</a:t>
-            </a:r>
-            <a:r>
-              <a:rPr lang="he-IL" dirty="0" smtClean="0"/>
-              <a:t>/</a:t>
-            </a:r>
-            <a:r>
-              <a:rPr lang="en-US" dirty="0" smtClean="0"/>
-              <a:t>NN</a:t>
-            </a:r>
-            <a:r>
-              <a:rPr lang="he-IL" dirty="0" smtClean="0"/>
-              <a:t>) להשוואה</a:t>
-            </a:r>
             <a:endParaRPr lang="en-US" dirty="0"/>
           </a:p>
         </p:txBody>
@@ -9492,7 +9618,7 @@
     </p:spTree>
     <p:extLst>
       <p:ext uri="{BB962C8B-B14F-4D97-AF65-F5344CB8AC3E}">
-        <p14:creationId xmlns:p14="http://schemas.microsoft.com/office/powerpoint/2010/main" val="3183284293"/>
+        <p14:creationId xmlns:p14="http://schemas.microsoft.com/office/powerpoint/2010/main" val="2215701404"/>
       </p:ext>
     </p:extLst>
   </p:cSld>

</xml_diff>